<commit_message>
Final Presenations and ADRs
</commit_message>
<xml_diff>
--- a/doc/architecture/presentation/Developer-Presentation.pptx
+++ b/doc/architecture/presentation/Developer-Presentation.pptx
@@ -10,6 +10,7 @@
     <p:sldId id="259" r:id="rId4"/>
     <p:sldId id="261" r:id="rId5"/>
     <p:sldId id="260" r:id="rId6"/>
+    <p:sldId id="262" r:id="rId7"/>
   </p:sldIdLst>
   <p:sldSz cx="12192000" cy="6858000"/>
   <p:notesSz cx="6858000" cy="9144000"/>
@@ -3451,7 +3452,7 @@
         <p:spPr>
           <a:xfrm>
             <a:off x="4452730" y="2174682"/>
-            <a:ext cx="2891625" cy="1938992"/>
+            <a:ext cx="3737113" cy="1569660"/>
           </a:xfrm>
           <a:prstGeom prst="rect">
             <a:avLst/>
@@ -10403,13 +10404,13 @@
   <p:clrMapOvr>
     <a:masterClrMapping/>
   </p:clrMapOvr>
-  <mc:AlternateContent xmlns:mc="http://schemas.openxmlformats.org/markup-compatibility/2006">
-    <mc:Choice xmlns:p14="http://schemas.microsoft.com/office/powerpoint/2010/main" Requires="p14">
+  <mc:AlternateContent xmlns:mc="http://schemas.openxmlformats.org/markup-compatibility/2006" xmlns:p14="http://schemas.microsoft.com/office/powerpoint/2010/main">
+    <mc:Choice Requires="p14">
       <p:transition spd="med" p14:dur="700">
         <p:fade/>
       </p:transition>
     </mc:Choice>
-    <mc:Fallback>
+    <mc:Fallback xmlns="">
       <p:transition spd="med">
         <p:fade/>
       </p:transition>
@@ -12228,18 +12229,48 @@
   <p:clrMapOvr>
     <a:masterClrMapping/>
   </p:clrMapOvr>
-  <mc:AlternateContent xmlns:mc="http://schemas.openxmlformats.org/markup-compatibility/2006">
-    <mc:Choice xmlns:p14="http://schemas.microsoft.com/office/powerpoint/2010/main" Requires="p14">
+  <mc:AlternateContent xmlns:mc="http://schemas.openxmlformats.org/markup-compatibility/2006" xmlns:p14="http://schemas.microsoft.com/office/powerpoint/2010/main">
+    <mc:Choice Requires="p14">
       <p:transition spd="med" p14:dur="700">
         <p:fade/>
       </p:transition>
     </mc:Choice>
-    <mc:Fallback>
+    <mc:Fallback xmlns="">
       <p:transition spd="med">
         <p:fade/>
       </p:transition>
     </mc:Fallback>
   </mc:AlternateContent>
+</p:sld>
+</file>
+
+<file path=ppt/slides/slide6.xml><?xml version="1.0" encoding="utf-8"?>
+<p:sld xmlns:a="http://schemas.openxmlformats.org/drawingml/2006/main" xmlns:r="http://schemas.openxmlformats.org/officeDocument/2006/relationships" xmlns:p="http://schemas.openxmlformats.org/presentationml/2006/main">
+  <p:cSld>
+    <p:spTree>
+      <p:nvGrpSpPr>
+        <p:cNvPr id="1" name=""/>
+        <p:cNvGrpSpPr/>
+        <p:nvPr/>
+      </p:nvGrpSpPr>
+      <p:grpSpPr>
+        <a:xfrm>
+          <a:off x="0" y="0"/>
+          <a:ext cx="0" cy="0"/>
+          <a:chOff x="0" y="0"/>
+          <a:chExt cx="0" cy="0"/>
+        </a:xfrm>
+      </p:grpSpPr>
+    </p:spTree>
+    <p:extLst>
+      <p:ext uri="{BB962C8B-B14F-4D97-AF65-F5344CB8AC3E}">
+        <p14:creationId xmlns:p14="http://schemas.microsoft.com/office/powerpoint/2010/main" val="3858474357"/>
+      </p:ext>
+    </p:extLst>
+  </p:cSld>
+  <p:clrMapOvr>
+    <a:masterClrMapping/>
+  </p:clrMapOvr>
 </p:sld>
 </file>
 

</xml_diff>